<commit_message>
update to return poll display only as string
</commit_message>
<xml_diff>
--- a/docs/diagrams/AddPollSequenceDiagram.pptx
+++ b/docs/diagrams/AddPollSequenceDiagram.pptx
@@ -208,7 +208,7 @@
           <a:p>
             <a:fld id="{F5CC4B3F-88C1-4FFA-B1B6-F41C21DC6924}" type="datetimeFigureOut">
               <a:rPr lang="en-US" smtClean="0"/>
-              <a:t>10/30/2018</a:t>
+              <a:t>11/5/2018</a:t>
             </a:fld>
             <a:endParaRPr lang="en-US"/>
           </a:p>
@@ -654,7 +654,7 @@
           <a:p>
             <a:fld id="{78C97017-6FC3-485B-9764-EAC9E56C1D49}" type="datetimeFigureOut">
               <a:rPr lang="en-US" smtClean="0"/>
-              <a:t>10/30/2018</a:t>
+              <a:t>11/5/2018</a:t>
             </a:fld>
             <a:endParaRPr lang="en-US"/>
           </a:p>
@@ -822,7 +822,7 @@
           <a:p>
             <a:fld id="{78C97017-6FC3-485B-9764-EAC9E56C1D49}" type="datetimeFigureOut">
               <a:rPr lang="en-US" smtClean="0"/>
-              <a:t>10/30/2018</a:t>
+              <a:t>11/5/2018</a:t>
             </a:fld>
             <a:endParaRPr lang="en-US"/>
           </a:p>
@@ -1000,7 +1000,7 @@
           <a:p>
             <a:fld id="{78C97017-6FC3-485B-9764-EAC9E56C1D49}" type="datetimeFigureOut">
               <a:rPr lang="en-US" smtClean="0"/>
-              <a:t>10/30/2018</a:t>
+              <a:t>11/5/2018</a:t>
             </a:fld>
             <a:endParaRPr lang="en-US"/>
           </a:p>
@@ -1168,7 +1168,7 @@
           <a:p>
             <a:fld id="{78C97017-6FC3-485B-9764-EAC9E56C1D49}" type="datetimeFigureOut">
               <a:rPr lang="en-US" smtClean="0"/>
-              <a:t>10/30/2018</a:t>
+              <a:t>11/5/2018</a:t>
             </a:fld>
             <a:endParaRPr lang="en-US"/>
           </a:p>
@@ -1413,7 +1413,7 @@
           <a:p>
             <a:fld id="{78C97017-6FC3-485B-9764-EAC9E56C1D49}" type="datetimeFigureOut">
               <a:rPr lang="en-US" smtClean="0"/>
-              <a:t>10/30/2018</a:t>
+              <a:t>11/5/2018</a:t>
             </a:fld>
             <a:endParaRPr lang="en-US"/>
           </a:p>
@@ -1698,7 +1698,7 @@
           <a:p>
             <a:fld id="{78C97017-6FC3-485B-9764-EAC9E56C1D49}" type="datetimeFigureOut">
               <a:rPr lang="en-US" smtClean="0"/>
-              <a:t>10/30/2018</a:t>
+              <a:t>11/5/2018</a:t>
             </a:fld>
             <a:endParaRPr lang="en-US"/>
           </a:p>
@@ -2117,7 +2117,7 @@
           <a:p>
             <a:fld id="{78C97017-6FC3-485B-9764-EAC9E56C1D49}" type="datetimeFigureOut">
               <a:rPr lang="en-US" smtClean="0"/>
-              <a:t>10/30/2018</a:t>
+              <a:t>11/5/2018</a:t>
             </a:fld>
             <a:endParaRPr lang="en-US"/>
           </a:p>
@@ -2234,7 +2234,7 @@
           <a:p>
             <a:fld id="{78C97017-6FC3-485B-9764-EAC9E56C1D49}" type="datetimeFigureOut">
               <a:rPr lang="en-US" smtClean="0"/>
-              <a:t>10/30/2018</a:t>
+              <a:t>11/5/2018</a:t>
             </a:fld>
             <a:endParaRPr lang="en-US"/>
           </a:p>
@@ -2329,7 +2329,7 @@
           <a:p>
             <a:fld id="{78C97017-6FC3-485B-9764-EAC9E56C1D49}" type="datetimeFigureOut">
               <a:rPr lang="en-US" smtClean="0"/>
-              <a:t>10/30/2018</a:t>
+              <a:t>11/5/2018</a:t>
             </a:fld>
             <a:endParaRPr lang="en-US"/>
           </a:p>
@@ -2604,7 +2604,7 @@
           <a:p>
             <a:fld id="{78C97017-6FC3-485B-9764-EAC9E56C1D49}" type="datetimeFigureOut">
               <a:rPr lang="en-US" smtClean="0"/>
-              <a:t>10/30/2018</a:t>
+              <a:t>11/5/2018</a:t>
             </a:fld>
             <a:endParaRPr lang="en-US"/>
           </a:p>
@@ -2856,7 +2856,7 @@
           <a:p>
             <a:fld id="{78C97017-6FC3-485B-9764-EAC9E56C1D49}" type="datetimeFigureOut">
               <a:rPr lang="en-US" smtClean="0"/>
-              <a:t>10/30/2018</a:t>
+              <a:t>11/5/2018</a:t>
             </a:fld>
             <a:endParaRPr lang="en-US"/>
           </a:p>
@@ -3067,7 +3067,7 @@
           <a:p>
             <a:fld id="{78C97017-6FC3-485B-9764-EAC9E56C1D49}" type="datetimeFigureOut">
               <a:rPr lang="en-US" smtClean="0"/>
-              <a:t>10/30/2018</a:t>
+              <a:t>11/5/2018</a:t>
             </a:fld>
             <a:endParaRPr lang="en-US"/>
           </a:p>

</xml_diff>

<commit_message>
update dev guide diagrams
</commit_message>
<xml_diff>
--- a/docs/diagrams/AddPollSequenceDiagram.pptx
+++ b/docs/diagrams/AddPollSequenceDiagram.pptx
@@ -208,7 +208,7 @@
           <a:p>
             <a:fld id="{F5CC4B3F-88C1-4FFA-B1B6-F41C21DC6924}" type="datetimeFigureOut">
               <a:rPr lang="en-US" smtClean="0"/>
-              <a:t>11/5/2018</a:t>
+              <a:t>11/6/2018</a:t>
             </a:fld>
             <a:endParaRPr lang="en-US"/>
           </a:p>
@@ -654,7 +654,7 @@
           <a:p>
             <a:fld id="{78C97017-6FC3-485B-9764-EAC9E56C1D49}" type="datetimeFigureOut">
               <a:rPr lang="en-US" smtClean="0"/>
-              <a:t>11/5/2018</a:t>
+              <a:t>11/6/2018</a:t>
             </a:fld>
             <a:endParaRPr lang="en-US"/>
           </a:p>
@@ -822,7 +822,7 @@
           <a:p>
             <a:fld id="{78C97017-6FC3-485B-9764-EAC9E56C1D49}" type="datetimeFigureOut">
               <a:rPr lang="en-US" smtClean="0"/>
-              <a:t>11/5/2018</a:t>
+              <a:t>11/6/2018</a:t>
             </a:fld>
             <a:endParaRPr lang="en-US"/>
           </a:p>
@@ -1000,7 +1000,7 @@
           <a:p>
             <a:fld id="{78C97017-6FC3-485B-9764-EAC9E56C1D49}" type="datetimeFigureOut">
               <a:rPr lang="en-US" smtClean="0"/>
-              <a:t>11/5/2018</a:t>
+              <a:t>11/6/2018</a:t>
             </a:fld>
             <a:endParaRPr lang="en-US"/>
           </a:p>
@@ -1168,7 +1168,7 @@
           <a:p>
             <a:fld id="{78C97017-6FC3-485B-9764-EAC9E56C1D49}" type="datetimeFigureOut">
               <a:rPr lang="en-US" smtClean="0"/>
-              <a:t>11/5/2018</a:t>
+              <a:t>11/6/2018</a:t>
             </a:fld>
             <a:endParaRPr lang="en-US"/>
           </a:p>
@@ -1413,7 +1413,7 @@
           <a:p>
             <a:fld id="{78C97017-6FC3-485B-9764-EAC9E56C1D49}" type="datetimeFigureOut">
               <a:rPr lang="en-US" smtClean="0"/>
-              <a:t>11/5/2018</a:t>
+              <a:t>11/6/2018</a:t>
             </a:fld>
             <a:endParaRPr lang="en-US"/>
           </a:p>
@@ -1698,7 +1698,7 @@
           <a:p>
             <a:fld id="{78C97017-6FC3-485B-9764-EAC9E56C1D49}" type="datetimeFigureOut">
               <a:rPr lang="en-US" smtClean="0"/>
-              <a:t>11/5/2018</a:t>
+              <a:t>11/6/2018</a:t>
             </a:fld>
             <a:endParaRPr lang="en-US"/>
           </a:p>
@@ -2117,7 +2117,7 @@
           <a:p>
             <a:fld id="{78C97017-6FC3-485B-9764-EAC9E56C1D49}" type="datetimeFigureOut">
               <a:rPr lang="en-US" smtClean="0"/>
-              <a:t>11/5/2018</a:t>
+              <a:t>11/6/2018</a:t>
             </a:fld>
             <a:endParaRPr lang="en-US"/>
           </a:p>
@@ -2234,7 +2234,7 @@
           <a:p>
             <a:fld id="{78C97017-6FC3-485B-9764-EAC9E56C1D49}" type="datetimeFigureOut">
               <a:rPr lang="en-US" smtClean="0"/>
-              <a:t>11/5/2018</a:t>
+              <a:t>11/6/2018</a:t>
             </a:fld>
             <a:endParaRPr lang="en-US"/>
           </a:p>
@@ -2329,7 +2329,7 @@
           <a:p>
             <a:fld id="{78C97017-6FC3-485B-9764-EAC9E56C1D49}" type="datetimeFigureOut">
               <a:rPr lang="en-US" smtClean="0"/>
-              <a:t>11/5/2018</a:t>
+              <a:t>11/6/2018</a:t>
             </a:fld>
             <a:endParaRPr lang="en-US"/>
           </a:p>
@@ -2604,7 +2604,7 @@
           <a:p>
             <a:fld id="{78C97017-6FC3-485B-9764-EAC9E56C1D49}" type="datetimeFigureOut">
               <a:rPr lang="en-US" smtClean="0"/>
-              <a:t>11/5/2018</a:t>
+              <a:t>11/6/2018</a:t>
             </a:fld>
             <a:endParaRPr lang="en-US"/>
           </a:p>
@@ -2856,7 +2856,7 @@
           <a:p>
             <a:fld id="{78C97017-6FC3-485B-9764-EAC9E56C1D49}" type="datetimeFigureOut">
               <a:rPr lang="en-US" smtClean="0"/>
-              <a:t>11/5/2018</a:t>
+              <a:t>11/6/2018</a:t>
             </a:fld>
             <a:endParaRPr lang="en-US"/>
           </a:p>
@@ -3067,7 +3067,7 @@
           <a:p>
             <a:fld id="{78C97017-6FC3-485B-9764-EAC9E56C1D49}" type="datetimeFigureOut">
               <a:rPr lang="en-US" smtClean="0"/>
-              <a:t>11/5/2018</a:t>
+              <a:t>11/6/2018</a:t>
             </a:fld>
             <a:endParaRPr lang="en-US"/>
           </a:p>
@@ -4113,7 +4113,7 @@
         </p:nvCxnSpPr>
         <p:spPr>
           <a:xfrm flipV="1">
-            <a:off x="4395706" y="3575866"/>
+            <a:off x="4395706" y="3352800"/>
             <a:ext cx="1470216" cy="6325"/>
           </a:xfrm>
           <a:prstGeom prst="straightConnector1">
@@ -4202,8 +4202,8 @@
         </p:nvSpPr>
         <p:spPr>
           <a:xfrm>
-            <a:off x="5805480" y="3111676"/>
-            <a:ext cx="129654" cy="457071"/>
+            <a:off x="5805480" y="3111677"/>
+            <a:ext cx="127945" cy="234798"/>
           </a:xfrm>
           <a:prstGeom prst="rect">
             <a:avLst/>
@@ -4321,7 +4321,7 @@
         <p:spPr>
           <a:xfrm>
             <a:off x="3287948" y="3919705"/>
-            <a:ext cx="127945" cy="184666"/>
+            <a:ext cx="976146" cy="184666"/>
           </a:xfrm>
           <a:prstGeom prst="rect">
             <a:avLst/>
@@ -4346,14 +4346,14 @@
           </a:lstStyle>
           <a:p>
             <a:r>
-              <a:rPr lang="en-US" sz="1200" dirty="0">
+              <a:rPr lang="en-US" sz="1200" dirty="0" err="1">
                 <a:solidFill>
                   <a:schemeClr val="accent4">
                     <a:lumMod val="75000"/>
                   </a:schemeClr>
                 </a:solidFill>
               </a:rPr>
-              <a:t>p</a:t>
+              <a:t>pollDetails</a:t>
             </a:r>
             <a:endParaRPr lang="en-US" sz="1200" dirty="0"/>
           </a:p>
@@ -4438,10 +4438,10 @@
       </p:sp>
       <p:sp>
         <p:nvSpPr>
-          <p:cNvPr id="62" name="TextBox 61">
+          <p:cNvPr id="64" name="TextBox 63">
             <a:extLst>
               <a:ext uri="{FF2B5EF4-FFF2-40B4-BE49-F238E27FC236}">
-                <a16:creationId xmlns:a16="http://schemas.microsoft.com/office/drawing/2014/main" id="{A44CB225-1968-4DED-A56D-0FECB0BE1D9F}"/>
+                <a16:creationId xmlns:a16="http://schemas.microsoft.com/office/drawing/2014/main" id="{3F10765A-4450-4AC9-9385-D21E7AC11415}"/>
               </a:ext>
             </a:extLst>
           </p:cNvPr>
@@ -4450,7 +4450,7 @@
         </p:nvSpPr>
         <p:spPr>
           <a:xfrm>
-            <a:off x="1828800" y="4082534"/>
+            <a:off x="5558894" y="3162301"/>
             <a:ext cx="127945" cy="184666"/>
           </a:xfrm>
           <a:prstGeom prst="rect">
@@ -4491,10 +4491,153 @@
       </p:sp>
       <p:sp>
         <p:nvSpPr>
-          <p:cNvPr id="64" name="TextBox 63">
+          <p:cNvPr id="23" name="Rectangle 22">
             <a:extLst>
               <a:ext uri="{FF2B5EF4-FFF2-40B4-BE49-F238E27FC236}">
-                <a16:creationId xmlns:a16="http://schemas.microsoft.com/office/drawing/2014/main" id="{3F10765A-4450-4AC9-9385-D21E7AC11415}"/>
+                <a16:creationId xmlns:a16="http://schemas.microsoft.com/office/drawing/2014/main" id="{58CCC62A-C55F-4BBC-82F5-34357656D266}"/>
+              </a:ext>
+            </a:extLst>
+          </p:cNvPr>
+          <p:cNvSpPr/>
+          <p:nvPr/>
+        </p:nvSpPr>
+        <p:spPr>
+          <a:xfrm>
+            <a:off x="5792010" y="3544386"/>
+            <a:ext cx="130486" cy="267666"/>
+          </a:xfrm>
+          <a:prstGeom prst="rect">
+            <a:avLst/>
+          </a:prstGeom>
+          <a:solidFill>
+            <a:srgbClr val="7030A0"/>
+          </a:solidFill>
+          <a:ln>
+            <a:solidFill>
+              <a:srgbClr val="7030A0"/>
+            </a:solidFill>
+          </a:ln>
+          <a:effectLst/>
+        </p:spPr>
+        <p:style>
+          <a:lnRef idx="1">
+            <a:schemeClr val="accent3"/>
+          </a:lnRef>
+          <a:fillRef idx="2">
+            <a:schemeClr val="accent3"/>
+          </a:fillRef>
+          <a:effectRef idx="1">
+            <a:schemeClr val="accent3"/>
+          </a:effectRef>
+          <a:fontRef idx="minor">
+            <a:schemeClr val="dk1"/>
+          </a:fontRef>
+        </p:style>
+        <p:txBody>
+          <a:bodyPr rtlCol="0" anchor="ctr"/>
+          <a:lstStyle/>
+          <a:p>
+            <a:pPr algn="ctr"/>
+            <a:endParaRPr lang="en-SG" sz="1400"/>
+          </a:p>
+        </p:txBody>
+      </p:sp>
+      <p:cxnSp>
+        <p:nvCxnSpPr>
+          <p:cNvPr id="24" name="Straight Arrow Connector 23">
+            <a:extLst>
+              <a:ext uri="{FF2B5EF4-FFF2-40B4-BE49-F238E27FC236}">
+                <a16:creationId xmlns:a16="http://schemas.microsoft.com/office/drawing/2014/main" id="{C5C6FC14-E1F5-427F-ABFB-0E970C66103F}"/>
+              </a:ext>
+            </a:extLst>
+          </p:cNvPr>
+          <p:cNvCxnSpPr>
+            <a:cxnSpLocks/>
+          </p:cNvCxnSpPr>
+          <p:nvPr/>
+        </p:nvCxnSpPr>
+        <p:spPr>
+          <a:xfrm flipV="1">
+            <a:off x="4390087" y="3537466"/>
+            <a:ext cx="1401923" cy="6920"/>
+          </a:xfrm>
+          <a:prstGeom prst="straightConnector1">
+            <a:avLst/>
+          </a:prstGeom>
+          <a:ln w="19050">
+            <a:solidFill>
+              <a:srgbClr val="7030A0"/>
+            </a:solidFill>
+            <a:tailEnd type="arrow"/>
+          </a:ln>
+        </p:spPr>
+        <p:style>
+          <a:lnRef idx="1">
+            <a:schemeClr val="accent1"/>
+          </a:lnRef>
+          <a:fillRef idx="0">
+            <a:schemeClr val="accent1"/>
+          </a:fillRef>
+          <a:effectRef idx="0">
+            <a:schemeClr val="accent1"/>
+          </a:effectRef>
+          <a:fontRef idx="minor">
+            <a:schemeClr val="tx1"/>
+          </a:fontRef>
+        </p:style>
+      </p:cxnSp>
+      <p:cxnSp>
+        <p:nvCxnSpPr>
+          <p:cNvPr id="27" name="Straight Arrow Connector 26">
+            <a:extLst>
+              <a:ext uri="{FF2B5EF4-FFF2-40B4-BE49-F238E27FC236}">
+                <a16:creationId xmlns:a16="http://schemas.microsoft.com/office/drawing/2014/main" id="{CE67A1EF-5343-4B41-B8F3-997457EC2196}"/>
+              </a:ext>
+            </a:extLst>
+          </p:cNvPr>
+          <p:cNvCxnSpPr>
+            <a:cxnSpLocks/>
+          </p:cNvCxnSpPr>
+          <p:nvPr/>
+        </p:nvCxnSpPr>
+        <p:spPr>
+          <a:xfrm flipV="1">
+            <a:off x="4371099" y="3797690"/>
+            <a:ext cx="1470216" cy="6325"/>
+          </a:xfrm>
+          <a:prstGeom prst="straightConnector1">
+            <a:avLst/>
+          </a:prstGeom>
+          <a:ln w="19050">
+            <a:solidFill>
+              <a:srgbClr val="7030A0"/>
+            </a:solidFill>
+            <a:prstDash val="sysDash"/>
+            <a:headEnd type="arrow" w="med" len="med"/>
+            <a:tailEnd type="none" w="med" len="med"/>
+          </a:ln>
+        </p:spPr>
+        <p:style>
+          <a:lnRef idx="1">
+            <a:schemeClr val="accent1"/>
+          </a:lnRef>
+          <a:fillRef idx="0">
+            <a:schemeClr val="accent1"/>
+          </a:fillRef>
+          <a:effectRef idx="0">
+            <a:schemeClr val="accent1"/>
+          </a:effectRef>
+          <a:fontRef idx="minor">
+            <a:schemeClr val="tx1"/>
+          </a:fontRef>
+        </p:style>
+      </p:cxnSp>
+      <p:sp>
+        <p:nvSpPr>
+          <p:cNvPr id="28" name="TextBox 27">
+            <a:extLst>
+              <a:ext uri="{FF2B5EF4-FFF2-40B4-BE49-F238E27FC236}">
+                <a16:creationId xmlns:a16="http://schemas.microsoft.com/office/drawing/2014/main" id="{52EE7CD2-D35F-48EC-9A06-A5C63418BF9B}"/>
               </a:ext>
             </a:extLst>
           </p:cNvPr>
@@ -4503,8 +4646,8 @@
         </p:nvSpPr>
         <p:spPr>
           <a:xfrm>
-            <a:off x="5129855" y="3581400"/>
-            <a:ext cx="127945" cy="184666"/>
+            <a:off x="4288835" y="3359125"/>
+            <a:ext cx="1408282" cy="169277"/>
           </a:xfrm>
           <a:prstGeom prst="rect">
             <a:avLst/>
@@ -4529,14 +4672,126 @@
           </a:lstStyle>
           <a:p>
             <a:r>
-              <a:rPr lang="en-US" sz="1200" dirty="0">
+              <a:rPr lang="en-US" sz="1100" dirty="0" err="1">
+                <a:solidFill>
+                  <a:srgbClr val="7030A0"/>
+                </a:solidFill>
+              </a:rPr>
+              <a:t>displayPoll</a:t>
+            </a:r>
+            <a:r>
+              <a:rPr lang="en-US" sz="1100" dirty="0">
+                <a:solidFill>
+                  <a:srgbClr val="7030A0"/>
+                </a:solidFill>
+              </a:rPr>
+              <a:t>()</a:t>
+            </a:r>
+            <a:endParaRPr lang="en-US" sz="1100" dirty="0"/>
+          </a:p>
+        </p:txBody>
+      </p:sp>
+      <p:sp>
+        <p:nvSpPr>
+          <p:cNvPr id="29" name="TextBox 28">
+            <a:extLst>
+              <a:ext uri="{FF2B5EF4-FFF2-40B4-BE49-F238E27FC236}">
+                <a16:creationId xmlns:a16="http://schemas.microsoft.com/office/drawing/2014/main" id="{929568EF-B2C1-460A-A0B3-85C3BC3A5394}"/>
+              </a:ext>
+            </a:extLst>
+          </p:cNvPr>
+          <p:cNvSpPr txBox="1"/>
+          <p:nvPr/>
+        </p:nvSpPr>
+        <p:spPr>
+          <a:xfrm>
+            <a:off x="4792849" y="3827372"/>
+            <a:ext cx="976146" cy="184666"/>
+          </a:xfrm>
+          <a:prstGeom prst="rect">
+            <a:avLst/>
+          </a:prstGeom>
+          <a:noFill/>
+        </p:spPr>
+        <p:txBody>
+          <a:bodyPr wrap="square" lIns="0" tIns="0" rIns="0" bIns="0" rtlCol="0">
+            <a:spAutoFit/>
+          </a:bodyPr>
+          <a:lstStyle>
+            <a:defPPr>
+              <a:defRPr lang="en-US"/>
+            </a:defPPr>
+            <a:lvl1pPr algn="r">
+              <a:defRPr sz="1400">
+                <a:solidFill>
+                  <a:srgbClr val="0070C0"/>
+                </a:solidFill>
+              </a:defRPr>
+            </a:lvl1pPr>
+          </a:lstStyle>
+          <a:p>
+            <a:r>
+              <a:rPr lang="en-US" sz="1200" dirty="0" err="1">
                 <a:solidFill>
                   <a:schemeClr val="accent4">
                     <a:lumMod val="75000"/>
                   </a:schemeClr>
                 </a:solidFill>
               </a:rPr>
-              <a:t>p</a:t>
+              <a:t>pollDetails</a:t>
+            </a:r>
+            <a:endParaRPr lang="en-US" sz="1200" dirty="0"/>
+          </a:p>
+        </p:txBody>
+      </p:sp>
+      <p:sp>
+        <p:nvSpPr>
+          <p:cNvPr id="30" name="TextBox 29">
+            <a:extLst>
+              <a:ext uri="{FF2B5EF4-FFF2-40B4-BE49-F238E27FC236}">
+                <a16:creationId xmlns:a16="http://schemas.microsoft.com/office/drawing/2014/main" id="{E5C53B22-89BC-49FE-ADF5-B6050F0E134E}"/>
+              </a:ext>
+            </a:extLst>
+          </p:cNvPr>
+          <p:cNvSpPr txBox="1"/>
+          <p:nvPr/>
+        </p:nvSpPr>
+        <p:spPr>
+          <a:xfrm>
+            <a:off x="1574370" y="4104371"/>
+            <a:ext cx="976146" cy="184666"/>
+          </a:xfrm>
+          <a:prstGeom prst="rect">
+            <a:avLst/>
+          </a:prstGeom>
+          <a:noFill/>
+        </p:spPr>
+        <p:txBody>
+          <a:bodyPr wrap="square" lIns="0" tIns="0" rIns="0" bIns="0" rtlCol="0">
+            <a:spAutoFit/>
+          </a:bodyPr>
+          <a:lstStyle>
+            <a:defPPr>
+              <a:defRPr lang="en-US"/>
+            </a:defPPr>
+            <a:lvl1pPr algn="r">
+              <a:defRPr sz="1400">
+                <a:solidFill>
+                  <a:srgbClr val="0070C0"/>
+                </a:solidFill>
+              </a:defRPr>
+            </a:lvl1pPr>
+          </a:lstStyle>
+          <a:p>
+            <a:r>
+              <a:rPr lang="en-US" sz="1200" dirty="0" err="1">
+                <a:solidFill>
+                  <a:schemeClr val="accent4">
+                    <a:lumMod val="75000"/>
+                  </a:schemeClr>
+                </a:solidFill>
+              </a:rPr>
+              <a:t>pollDetails</a:t>
             </a:r>
             <a:endParaRPr lang="en-US" sz="1200" dirty="0"/>
           </a:p>

</xml_diff>